<commit_message>
Added to slides since there's no longer a live demo
</commit_message>
<xml_diff>
--- a/PRESENTATION_Wren_McQueary_Final_Project_CS_685.pptx
+++ b/PRESENTATION_Wren_McQueary_Final_Project_CS_685.pptx
@@ -241,7 +241,7 @@
           <a:p>
             <a:fld id="{62A5AE42-7DC1-8140-9B13-146984FDEF22}" type="datetimeFigureOut">
               <a:rPr lang="en-US" smtClean="0"/>
-              <a:t>11/15/2022</a:t>
+              <a:t>11/28/2022</a:t>
             </a:fld>
             <a:endParaRPr lang="en-US" dirty="0"/>
           </a:p>
@@ -418,7 +418,7 @@
           <a:p>
             <a:fld id="{E8F75F72-8950-AF4F-9381-1D26FB547EA1}" type="datetimeFigureOut">
               <a:rPr lang="en-US" smtClean="0"/>
-              <a:t>11/15/2022</a:t>
+              <a:t>11/28/2022</a:t>
             </a:fld>
             <a:endParaRPr lang="en-US" dirty="0"/>
           </a:p>
@@ -11700,40 +11700,197 @@
           </a:p>
         </p:txBody>
       </p:sp>
-      <p:sp>
-        <p:nvSpPr>
-          <p:cNvPr id="4" name="Content Placeholder 3">
-            <a:extLst>
-              <a:ext uri="{FF2B5EF4-FFF2-40B4-BE49-F238E27FC236}">
-                <a16:creationId xmlns:a16="http://schemas.microsoft.com/office/drawing/2014/main" id="{387BC30F-9491-9EFF-A59F-EFB3469766F6}"/>
-              </a:ext>
-            </a:extLst>
-          </p:cNvPr>
-          <p:cNvSpPr>
-            <a:spLocks noGrp="1"/>
-          </p:cNvSpPr>
+      <p:pic>
+        <p:nvPicPr>
+          <p:cNvPr id="8" name="Content Placeholder 7">
+            <a:extLst>
+              <a:ext uri="{FF2B5EF4-FFF2-40B4-BE49-F238E27FC236}">
+                <a16:creationId xmlns:a16="http://schemas.microsoft.com/office/drawing/2014/main" id="{6D98B1FD-55C5-E54A-A5EE-10A70444E76B}"/>
+              </a:ext>
+            </a:extLst>
+          </p:cNvPr>
+          <p:cNvPicPr>
+            <a:picLocks noGrp="1" noChangeAspect="1"/>
+          </p:cNvPicPr>
           <p:nvPr>
             <p:ph idx="1"/>
           </p:nvPr>
-        </p:nvSpPr>
-        <p:spPr>
-          <a:xfrm>
-            <a:off x="838200" y="1825625"/>
-            <a:ext cx="10515600" cy="2330739"/>
-          </a:xfrm>
-        </p:spPr>
-        <p:txBody>
-          <a:bodyPr/>
+        </p:nvPicPr>
+        <p:blipFill>
+          <a:blip r:embed="rId3"/>
+          <a:stretch>
+            <a:fillRect/>
+          </a:stretch>
+        </p:blipFill>
+        <p:spPr>
+          <a:xfrm>
+            <a:off x="700670" y="1874829"/>
+            <a:ext cx="3043318" cy="2521606"/>
+          </a:xfrm>
+        </p:spPr>
+      </p:pic>
+      <p:pic>
+        <p:nvPicPr>
+          <p:cNvPr id="10" name="Picture 9">
+            <a:extLst>
+              <a:ext uri="{FF2B5EF4-FFF2-40B4-BE49-F238E27FC236}">
+                <a16:creationId xmlns:a16="http://schemas.microsoft.com/office/drawing/2014/main" id="{4E1E1117-3845-5858-2249-7105B9EFF433}"/>
+              </a:ext>
+            </a:extLst>
+          </p:cNvPr>
+          <p:cNvPicPr>
+            <a:picLocks noChangeAspect="1"/>
+          </p:cNvPicPr>
+          <p:nvPr/>
+        </p:nvPicPr>
+        <p:blipFill>
+          <a:blip r:embed="rId4"/>
+          <a:stretch>
+            <a:fillRect/>
+          </a:stretch>
+        </p:blipFill>
+        <p:spPr>
+          <a:xfrm>
+            <a:off x="4666861" y="1942419"/>
+            <a:ext cx="2858278" cy="2521606"/>
+          </a:xfrm>
+          <a:prstGeom prst="rect">
+            <a:avLst/>
+          </a:prstGeom>
+        </p:spPr>
+      </p:pic>
+      <p:pic>
+        <p:nvPicPr>
+          <p:cNvPr id="12" name="Picture 11">
+            <a:extLst>
+              <a:ext uri="{FF2B5EF4-FFF2-40B4-BE49-F238E27FC236}">
+                <a16:creationId xmlns:a16="http://schemas.microsoft.com/office/drawing/2014/main" id="{3A5797B2-1A19-8FFE-C169-3D7BF3100295}"/>
+              </a:ext>
+            </a:extLst>
+          </p:cNvPr>
+          <p:cNvPicPr>
+            <a:picLocks noChangeAspect="1"/>
+          </p:cNvPicPr>
+          <p:nvPr/>
+        </p:nvPicPr>
+        <p:blipFill>
+          <a:blip r:embed="rId5"/>
+          <a:stretch>
+            <a:fillRect/>
+          </a:stretch>
+        </p:blipFill>
+        <p:spPr>
+          <a:xfrm>
+            <a:off x="8633052" y="1942419"/>
+            <a:ext cx="2858278" cy="2528207"/>
+          </a:xfrm>
+          <a:prstGeom prst="rect">
+            <a:avLst/>
+          </a:prstGeom>
+        </p:spPr>
+      </p:pic>
+      <p:sp>
+        <p:nvSpPr>
+          <p:cNvPr id="13" name="TextBox 12">
+            <a:extLst>
+              <a:ext uri="{FF2B5EF4-FFF2-40B4-BE49-F238E27FC236}">
+                <a16:creationId xmlns:a16="http://schemas.microsoft.com/office/drawing/2014/main" id="{F031457A-7ABE-0E13-1A9C-94F41028B43A}"/>
+              </a:ext>
+            </a:extLst>
+          </p:cNvPr>
+          <p:cNvSpPr txBox="1"/>
+          <p:nvPr/>
+        </p:nvSpPr>
+        <p:spPr>
+          <a:xfrm>
+            <a:off x="1312507" y="4783494"/>
+            <a:ext cx="1306961" cy="369332"/>
+          </a:xfrm>
+          <a:prstGeom prst="rect">
+            <a:avLst/>
+          </a:prstGeom>
+          <a:noFill/>
+        </p:spPr>
+        <p:txBody>
+          <a:bodyPr wrap="none" rtlCol="0">
+            <a:spAutoFit/>
+          </a:bodyPr>
           <a:lstStyle/>
           <a:p>
-            <a:pPr marL="0" indent="0">
-              <a:buNone/>
-            </a:pPr>
-            <a:r>
-              <a:rPr lang="en-US" b="1" dirty="0"/>
-              <a:t>(Show demo)</a:t>
-            </a:r>
-            <a:endParaRPr lang="en-US" dirty="0"/>
+            <a:r>
+              <a:rPr lang="en-US" dirty="0"/>
+              <a:t>Draw points</a:t>
+            </a:r>
+          </a:p>
+        </p:txBody>
+      </p:sp>
+      <p:sp>
+        <p:nvSpPr>
+          <p:cNvPr id="14" name="TextBox 13">
+            <a:extLst>
+              <a:ext uri="{FF2B5EF4-FFF2-40B4-BE49-F238E27FC236}">
+                <a16:creationId xmlns:a16="http://schemas.microsoft.com/office/drawing/2014/main" id="{18DE06F3-6976-E18A-7D5F-F53CD2D27322}"/>
+              </a:ext>
+            </a:extLst>
+          </p:cNvPr>
+          <p:cNvSpPr txBox="1"/>
+          <p:nvPr/>
+        </p:nvSpPr>
+        <p:spPr>
+          <a:xfrm>
+            <a:off x="5442519" y="4783494"/>
+            <a:ext cx="974113" cy="369332"/>
+          </a:xfrm>
+          <a:prstGeom prst="rect">
+            <a:avLst/>
+          </a:prstGeom>
+          <a:noFill/>
+        </p:spPr>
+        <p:txBody>
+          <a:bodyPr wrap="none" rtlCol="0">
+            <a:spAutoFit/>
+          </a:bodyPr>
+          <a:lstStyle/>
+          <a:p>
+            <a:r>
+              <a:rPr lang="en-US" dirty="0"/>
+              <a:t>Make art</a:t>
+            </a:r>
+          </a:p>
+        </p:txBody>
+      </p:sp>
+      <p:sp>
+        <p:nvSpPr>
+          <p:cNvPr id="15" name="TextBox 14">
+            <a:extLst>
+              <a:ext uri="{FF2B5EF4-FFF2-40B4-BE49-F238E27FC236}">
+                <a16:creationId xmlns:a16="http://schemas.microsoft.com/office/drawing/2014/main" id="{16B5F5D9-83A7-314A-5976-1AD4E0F556D4}"/>
+              </a:ext>
+            </a:extLst>
+          </p:cNvPr>
+          <p:cNvSpPr txBox="1"/>
+          <p:nvPr/>
+        </p:nvSpPr>
+        <p:spPr>
+          <a:xfrm>
+            <a:off x="9273449" y="4783494"/>
+            <a:ext cx="1577483" cy="369332"/>
+          </a:xfrm>
+          <a:prstGeom prst="rect">
+            <a:avLst/>
+          </a:prstGeom>
+          <a:noFill/>
+        </p:spPr>
+        <p:txBody>
+          <a:bodyPr wrap="none" rtlCol="0">
+            <a:spAutoFit/>
+          </a:bodyPr>
+          <a:lstStyle/>
+          <a:p>
+            <a:r>
+              <a:rPr lang="en-US" dirty="0"/>
+              <a:t>Avoid obstacles</a:t>
+            </a:r>
           </a:p>
         </p:txBody>
       </p:sp>
@@ -12052,34 +12209,6 @@
       </p:grpSpPr>
       <p:sp>
         <p:nvSpPr>
-          <p:cNvPr id="2" name="Title 1">
-            <a:extLst>
-              <a:ext uri="{FF2B5EF4-FFF2-40B4-BE49-F238E27FC236}">
-                <a16:creationId xmlns:a16="http://schemas.microsoft.com/office/drawing/2014/main" id="{800B4516-A78C-D69C-2051-684BD2AB4940}"/>
-              </a:ext>
-            </a:extLst>
-          </p:cNvPr>
-          <p:cNvSpPr>
-            <a:spLocks noGrp="1"/>
-          </p:cNvSpPr>
-          <p:nvPr>
-            <p:ph type="title"/>
-          </p:nvPr>
-        </p:nvSpPr>
-        <p:spPr/>
-        <p:txBody>
-          <a:bodyPr/>
-          <a:lstStyle/>
-          <a:p>
-            <a:r>
-              <a:rPr lang="en-US" dirty="0"/>
-              <a:t>What I built</a:t>
-            </a:r>
-          </a:p>
-        </p:txBody>
-      </p:sp>
-      <p:sp>
-        <p:nvSpPr>
           <p:cNvPr id="5" name="Slide Number Placeholder 4">
             <a:extLst>
               <a:ext uri="{FF2B5EF4-FFF2-40B4-BE49-F238E27FC236}">
@@ -12108,52 +12237,6 @@
           </a:p>
         </p:txBody>
       </p:sp>
-      <p:sp>
-        <p:nvSpPr>
-          <p:cNvPr id="4" name="Content Placeholder 3">
-            <a:extLst>
-              <a:ext uri="{FF2B5EF4-FFF2-40B4-BE49-F238E27FC236}">
-                <a16:creationId xmlns:a16="http://schemas.microsoft.com/office/drawing/2014/main" id="{387BC30F-9491-9EFF-A59F-EFB3469766F6}"/>
-              </a:ext>
-            </a:extLst>
-          </p:cNvPr>
-          <p:cNvSpPr>
-            <a:spLocks noGrp="1"/>
-          </p:cNvSpPr>
-          <p:nvPr>
-            <p:ph idx="1"/>
-          </p:nvPr>
-        </p:nvSpPr>
-        <p:spPr>
-          <a:xfrm>
-            <a:off x="838200" y="1442783"/>
-            <a:ext cx="10515600" cy="2330739"/>
-          </a:xfrm>
-        </p:spPr>
-        <p:txBody>
-          <a:bodyPr/>
-          <a:lstStyle/>
-          <a:p>
-            <a:pPr marL="0" indent="0">
-              <a:buNone/>
-            </a:pPr>
-            <a:r>
-              <a:rPr lang="en-US" b="1" dirty="0"/>
-              <a:t>Results and discussion</a:t>
-            </a:r>
-            <a:r>
-              <a:rPr lang="en-US" dirty="0"/>
-              <a:t>:</a:t>
-            </a:r>
-          </a:p>
-          <a:p>
-            <a:pPr marL="0" indent="0">
-              <a:buNone/>
-            </a:pPr>
-            <a:endParaRPr lang="en-US" dirty="0"/>
-          </a:p>
-        </p:txBody>
-      </p:sp>
       <p:graphicFrame>
         <p:nvGraphicFramePr>
           <p:cNvPr id="6" name="Table 6">
@@ -12169,14 +12252,14 @@
           <p:nvPr>
             <p:extLst>
               <p:ext uri="{D42A27DB-BD31-4B8C-83A1-F6EECF244321}">
-                <p14:modId xmlns:p14="http://schemas.microsoft.com/office/powerpoint/2010/main" val="3378869097"/>
+                <p14:modId xmlns:p14="http://schemas.microsoft.com/office/powerpoint/2010/main" val="2472435260"/>
               </p:ext>
             </p:extLst>
           </p:nvPr>
         </p:nvGraphicFramePr>
         <p:xfrm>
-          <a:off x="838200" y="2044000"/>
-          <a:ext cx="10515600" cy="4790729"/>
+          <a:off x="0" y="0"/>
+          <a:ext cx="12192000" cy="6858001"/>
         </p:xfrm>
         <a:graphic>
           <a:graphicData uri="http://schemas.openxmlformats.org/drawingml/2006/table">
@@ -12185,35 +12268,35 @@
                 <a:tableStyleId>{5C22544A-7EE6-4342-B048-85BDC9FD1C3A}</a:tableStyleId>
               </a:tblPr>
               <a:tblGrid>
-                <a:gridCol w="2103120">
+                <a:gridCol w="1909665">
                   <a:extLst>
                     <a:ext uri="{9D8B030D-6E8A-4147-A177-3AD203B41FA5}">
                       <a16:colId xmlns:a16="http://schemas.microsoft.com/office/drawing/2014/main" val="3906729406"/>
                     </a:ext>
                   </a:extLst>
                 </a:gridCol>
-                <a:gridCol w="1133530">
+                <a:gridCol w="2960915">
                   <a:extLst>
                     <a:ext uri="{9D8B030D-6E8A-4147-A177-3AD203B41FA5}">
                       <a16:colId xmlns:a16="http://schemas.microsoft.com/office/drawing/2014/main" val="897932321"/>
                     </a:ext>
                   </a:extLst>
                 </a:gridCol>
-                <a:gridCol w="3072710">
+                <a:gridCol w="2444620">
                   <a:extLst>
                     <a:ext uri="{9D8B030D-6E8A-4147-A177-3AD203B41FA5}">
                       <a16:colId xmlns:a16="http://schemas.microsoft.com/office/drawing/2014/main" val="336128852"/>
                     </a:ext>
                   </a:extLst>
                 </a:gridCol>
-                <a:gridCol w="2103120">
+                <a:gridCol w="2438400">
                   <a:extLst>
                     <a:ext uri="{9D8B030D-6E8A-4147-A177-3AD203B41FA5}">
                       <a16:colId xmlns:a16="http://schemas.microsoft.com/office/drawing/2014/main" val="1270659979"/>
                     </a:ext>
                   </a:extLst>
                 </a:gridCol>
-                <a:gridCol w="2103120">
+                <a:gridCol w="2438400">
                   <a:extLst>
                     <a:ext uri="{9D8B030D-6E8A-4147-A177-3AD203B41FA5}">
                       <a16:colId xmlns:a16="http://schemas.microsoft.com/office/drawing/2014/main" val="491159385"/>
@@ -12221,7 +12304,7 @@
                   </a:extLst>
                 </a:gridCol>
               </a:tblGrid>
-              <a:tr h="557701">
+              <a:tr h="606986">
                 <a:tc>
                   <a:txBody>
                     <a:bodyPr/>
@@ -12242,7 +12325,7 @@
                     <a:p>
                       <a:r>
                         <a:rPr lang="en-US" sz="1600" dirty="0"/>
-                        <a:t>Obstacle avoidance?</a:t>
+                        <a:t>Image</a:t>
                       </a:r>
                     </a:p>
                   </a:txBody>
@@ -12293,7 +12376,7 @@
                   </a:ext>
                 </a:extLst>
               </a:tr>
-              <a:tr h="557701">
+              <a:tr h="902325">
                 <a:tc>
                   <a:txBody>
                     <a:bodyPr/>
@@ -12362,7 +12445,7 @@
                   </a:ext>
                 </a:extLst>
               </a:tr>
-              <a:tr h="557701">
+              <a:tr h="902325">
                 <a:tc>
                   <a:txBody>
                     <a:bodyPr/>
@@ -12431,7 +12514,7 @@
                   </a:ext>
                 </a:extLst>
               </a:tr>
-              <a:tr h="962607">
+              <a:tr h="1557435">
                 <a:tc>
                   <a:txBody>
                     <a:bodyPr/>
@@ -12439,7 +12522,11 @@
                     <a:p>
                       <a:r>
                         <a:rPr lang="en-US" sz="1600" dirty="0"/>
-                        <a:t>Smile</a:t>
+                        <a:t>Smile </a:t>
+                      </a:r>
+                      <a:r>
+                        <a:rPr lang="en-US" sz="1600" b="1" dirty="0"/>
+                        <a:t>with obstacle avoidance</a:t>
                       </a:r>
                     </a:p>
                   </a:txBody>
@@ -12450,10 +12537,7 @@
                     <a:bodyPr/>
                     <a:lstStyle/>
                     <a:p>
-                      <a:r>
-                        <a:rPr lang="en-US" sz="1600" dirty="0"/>
-                        <a:t>Y</a:t>
-                      </a:r>
+                      <a:endParaRPr lang="en-US" sz="1600" dirty="0"/>
                     </a:p>
                   </a:txBody>
                   <a:tcPr/>
@@ -12503,7 +12587,7 @@
                   </a:ext>
                 </a:extLst>
               </a:tr>
-              <a:tr h="962607">
+              <a:tr h="1557435">
                 <a:tc>
                   <a:txBody>
                     <a:bodyPr/>
@@ -12527,10 +12611,7 @@
                     <a:bodyPr/>
                     <a:lstStyle/>
                     <a:p>
-                      <a:r>
-                        <a:rPr lang="en-US" sz="1600" dirty="0"/>
-                        <a:t>Y</a:t>
-                      </a:r>
+                      <a:endParaRPr lang="en-US" sz="1600" dirty="0"/>
                     </a:p>
                   </a:txBody>
                   <a:tcPr/>
@@ -12580,7 +12661,7 @@
                   </a:ext>
                 </a:extLst>
               </a:tr>
-              <a:tr h="557701">
+              <a:tr h="1331495">
                 <a:tc>
                   <a:txBody>
                     <a:bodyPr/>
@@ -12604,10 +12685,7 @@
                     <a:bodyPr/>
                     <a:lstStyle/>
                     <a:p>
-                      <a:r>
-                        <a:rPr lang="en-US" sz="1600" dirty="0"/>
-                        <a:t>Y</a:t>
-                      </a:r>
+                      <a:endParaRPr lang="en-US" sz="1600" dirty="0"/>
                     </a:p>
                   </a:txBody>
                   <a:tcPr/>
@@ -12661,6 +12739,155 @@
           </a:graphicData>
         </a:graphic>
       </p:graphicFrame>
+      <p:pic>
+        <p:nvPicPr>
+          <p:cNvPr id="7" name="Picture 6">
+            <a:extLst>
+              <a:ext uri="{FF2B5EF4-FFF2-40B4-BE49-F238E27FC236}">
+                <a16:creationId xmlns:a16="http://schemas.microsoft.com/office/drawing/2014/main" id="{A5A85FFC-DA15-4508-E2B3-4741064BE9B2}"/>
+              </a:ext>
+            </a:extLst>
+          </p:cNvPr>
+          <p:cNvPicPr>
+            <a:picLocks noChangeAspect="1"/>
+          </p:cNvPicPr>
+          <p:nvPr/>
+        </p:nvPicPr>
+        <p:blipFill>
+          <a:blip r:embed="rId3"/>
+          <a:stretch>
+            <a:fillRect/>
+          </a:stretch>
+        </p:blipFill>
+        <p:spPr>
+          <a:xfrm>
+            <a:off x="2013177" y="430762"/>
+            <a:ext cx="1488912" cy="1233670"/>
+          </a:xfrm>
+          <a:prstGeom prst="rect">
+            <a:avLst/>
+          </a:prstGeom>
+        </p:spPr>
+      </p:pic>
+      <p:pic>
+        <p:nvPicPr>
+          <p:cNvPr id="11" name="Content Placeholder 10">
+            <a:extLst>
+              <a:ext uri="{FF2B5EF4-FFF2-40B4-BE49-F238E27FC236}">
+                <a16:creationId xmlns:a16="http://schemas.microsoft.com/office/drawing/2014/main" id="{1E757F90-881B-8948-EFAC-61E54F0C4DB3}"/>
+              </a:ext>
+            </a:extLst>
+          </p:cNvPr>
+          <p:cNvPicPr>
+            <a:picLocks noGrp="1" noChangeAspect="1"/>
+          </p:cNvPicPr>
+          <p:nvPr>
+            <p:ph idx="1"/>
+          </p:nvPr>
+        </p:nvPicPr>
+        <p:blipFill>
+          <a:blip r:embed="rId4"/>
+          <a:stretch>
+            <a:fillRect/>
+          </a:stretch>
+        </p:blipFill>
+        <p:spPr>
+          <a:xfrm>
+            <a:off x="3456474" y="1370554"/>
+            <a:ext cx="1407885" cy="1242052"/>
+          </a:xfrm>
+        </p:spPr>
+      </p:pic>
+      <p:pic>
+        <p:nvPicPr>
+          <p:cNvPr id="13" name="Picture 12">
+            <a:extLst>
+              <a:ext uri="{FF2B5EF4-FFF2-40B4-BE49-F238E27FC236}">
+                <a16:creationId xmlns:a16="http://schemas.microsoft.com/office/drawing/2014/main" id="{AF9E65B4-A687-910A-7FAE-22E98E85225D}"/>
+              </a:ext>
+            </a:extLst>
+          </p:cNvPr>
+          <p:cNvPicPr>
+            <a:picLocks noChangeAspect="1"/>
+          </p:cNvPicPr>
+          <p:nvPr/>
+        </p:nvPicPr>
+        <p:blipFill>
+          <a:blip r:embed="rId5"/>
+          <a:stretch>
+            <a:fillRect/>
+          </a:stretch>
+        </p:blipFill>
+        <p:spPr>
+          <a:xfrm>
+            <a:off x="1935842" y="2404588"/>
+            <a:ext cx="1765529" cy="1471274"/>
+          </a:xfrm>
+          <a:prstGeom prst="rect">
+            <a:avLst/>
+          </a:prstGeom>
+        </p:spPr>
+      </p:pic>
+      <p:pic>
+        <p:nvPicPr>
+          <p:cNvPr id="15" name="Picture 14">
+            <a:extLst>
+              <a:ext uri="{FF2B5EF4-FFF2-40B4-BE49-F238E27FC236}">
+                <a16:creationId xmlns:a16="http://schemas.microsoft.com/office/drawing/2014/main" id="{B3C41C3F-798D-6404-EFFD-6C9D66550D0C}"/>
+              </a:ext>
+            </a:extLst>
+          </p:cNvPr>
+          <p:cNvPicPr>
+            <a:picLocks noChangeAspect="1"/>
+          </p:cNvPicPr>
+          <p:nvPr/>
+        </p:nvPicPr>
+        <p:blipFill>
+          <a:blip r:embed="rId6"/>
+          <a:stretch>
+            <a:fillRect/>
+          </a:stretch>
+        </p:blipFill>
+        <p:spPr>
+          <a:xfrm>
+            <a:off x="2663241" y="3875862"/>
+            <a:ext cx="2201118" cy="1791840"/>
+          </a:xfrm>
+          <a:prstGeom prst="rect">
+            <a:avLst/>
+          </a:prstGeom>
+        </p:spPr>
+      </p:pic>
+      <p:pic>
+        <p:nvPicPr>
+          <p:cNvPr id="17" name="Picture 16">
+            <a:extLst>
+              <a:ext uri="{FF2B5EF4-FFF2-40B4-BE49-F238E27FC236}">
+                <a16:creationId xmlns:a16="http://schemas.microsoft.com/office/drawing/2014/main" id="{CC5A358F-3E31-B23B-8162-B7B299679153}"/>
+              </a:ext>
+            </a:extLst>
+          </p:cNvPr>
+          <p:cNvPicPr>
+            <a:picLocks noChangeAspect="1"/>
+          </p:cNvPicPr>
+          <p:nvPr/>
+        </p:nvPicPr>
+        <p:blipFill>
+          <a:blip r:embed="rId7"/>
+          <a:stretch>
+            <a:fillRect/>
+          </a:stretch>
+        </p:blipFill>
+        <p:spPr>
+          <a:xfrm>
+            <a:off x="1743354" y="5498788"/>
+            <a:ext cx="1663357" cy="1471274"/>
+          </a:xfrm>
+          <a:prstGeom prst="rect">
+            <a:avLst/>
+          </a:prstGeom>
+        </p:spPr>
+      </p:pic>
     </p:spTree>
     <p:extLst>
       <p:ext uri="{BB962C8B-B14F-4D97-AF65-F5344CB8AC3E}">
@@ -13449,12 +13676,12 @@
         <p:spPr>
           <a:xfrm>
             <a:off x="838200" y="1825625"/>
-            <a:ext cx="6560875" cy="4377467"/>
+            <a:ext cx="6560875" cy="4755567"/>
           </a:xfrm>
         </p:spPr>
         <p:txBody>
           <a:bodyPr>
-            <a:normAutofit/>
+            <a:normAutofit fontScale="92500" lnSpcReduction="10000"/>
           </a:bodyPr>
           <a:lstStyle/>
           <a:p>
@@ -13488,6 +13715,25 @@
               <a:rPr lang="en-US" dirty="0"/>
               <a:t>Angles are arranged similarly to a construction crane</a:t>
             </a:r>
+          </a:p>
+          <a:p>
+            <a:pPr lvl="1"/>
+            <a:endParaRPr lang="en-US" dirty="0"/>
+          </a:p>
+          <a:p>
+            <a:pPr lvl="1"/>
+            <a:endParaRPr lang="en-US" dirty="0"/>
+          </a:p>
+          <a:p>
+            <a:pPr lvl="1"/>
+            <a:endParaRPr lang="en-US" dirty="0"/>
+          </a:p>
+          <a:p>
+            <a:pPr lvl="1"/>
+            <a:endParaRPr lang="en-US" dirty="0"/>
+          </a:p>
+          <a:p>
+            <a:endParaRPr lang="en-US" dirty="0"/>
           </a:p>
           <a:p>
             <a:r>
@@ -13521,6 +13767,36 @@
           <a:xfrm>
             <a:off x="7399075" y="2298730"/>
             <a:ext cx="4363059" cy="3715268"/>
+          </a:xfrm>
+          <a:prstGeom prst="rect">
+            <a:avLst/>
+          </a:prstGeom>
+        </p:spPr>
+      </p:pic>
+      <p:pic>
+        <p:nvPicPr>
+          <p:cNvPr id="7" name="Picture 6">
+            <a:extLst>
+              <a:ext uri="{FF2B5EF4-FFF2-40B4-BE49-F238E27FC236}">
+                <a16:creationId xmlns:a16="http://schemas.microsoft.com/office/drawing/2014/main" id="{BC7F465A-B69A-390A-612C-A7DBDF234336}"/>
+              </a:ext>
+            </a:extLst>
+          </p:cNvPr>
+          <p:cNvPicPr>
+            <a:picLocks noChangeAspect="1"/>
+          </p:cNvPicPr>
+          <p:nvPr/>
+        </p:nvPicPr>
+        <p:blipFill>
+          <a:blip r:embed="rId4"/>
+          <a:stretch>
+            <a:fillRect/>
+          </a:stretch>
+        </p:blipFill>
+        <p:spPr>
+          <a:xfrm>
+            <a:off x="1581221" y="4112821"/>
+            <a:ext cx="2288672" cy="1765465"/>
           </a:xfrm>
           <a:prstGeom prst="rect">
             <a:avLst/>
@@ -15136,35 +15412,6 @@
 </file>
 
 <file path=customXml/item1.xml><?xml version="1.0" encoding="utf-8"?>
-<?mso-contentType ?>
-<FormTemplates xmlns="http://schemas.microsoft.com/sharepoint/v3/contenttype/forms">
-  <Display>DocumentLibraryForm</Display>
-  <Edit>DocumentLibraryForm</Edit>
-  <New>DocumentLibraryForm</New>
-</FormTemplates>
-</file>
-
-<file path=customXml/item2.xml><?xml version="1.0" encoding="utf-8"?>
-<p:properties xmlns:p="http://schemas.microsoft.com/office/2006/metadata/properties" xmlns:xsi="http://www.w3.org/2001/XMLSchema-instance" xmlns:pc="http://schemas.microsoft.com/office/infopath/2007/PartnerControls">
-  <documentManagement>
-    <_ip_UnifiedCompliancePolicyUIAction xmlns="http://schemas.microsoft.com/sharepoint/v3" xsi:nil="true"/>
-    <Image xmlns="71af3243-3dd4-4a8d-8c0d-dd76da1f02a5">
-      <Url xsi:nil="true"/>
-      <Description xsi:nil="true"/>
-    </Image>
-    <Status xmlns="71af3243-3dd4-4a8d-8c0d-dd76da1f02a5">Not started</Status>
-    <Background xmlns="71af3243-3dd4-4a8d-8c0d-dd76da1f02a5">false</Background>
-    <_ip_UnifiedCompliancePolicyProperties xmlns="http://schemas.microsoft.com/sharepoint/v3" xsi:nil="true"/>
-    <ImageTagsTaxHTField xmlns="71af3243-3dd4-4a8d-8c0d-dd76da1f02a5">
-      <Terms xmlns="http://schemas.microsoft.com/office/infopath/2007/PartnerControls"/>
-    </ImageTagsTaxHTField>
-    <TaxCatchAll xmlns="230e9df3-be65-4c73-a93b-d1236ebd677e" xsi:nil="true"/>
-    <MediaServiceKeyPoints xmlns="71af3243-3dd4-4a8d-8c0d-dd76da1f02a5" xsi:nil="true"/>
-  </documentManagement>
-</p:properties>
-</file>
-
-<file path=customXml/item3.xml><?xml version="1.0" encoding="utf-8"?>
 <ct:contentTypeSchema xmlns:ct="http://schemas.microsoft.com/office/2006/metadata/contentType" xmlns:ma="http://schemas.microsoft.com/office/2006/metadata/properties/metaAttributes" ct:_="" ma:_="" ma:contentTypeName="Document" ma:contentTypeID="0x01010079F111ED35F8CC479449609E8A0923A6" ma:contentTypeVersion="24" ma:contentTypeDescription="Create a new document." ma:contentTypeScope="" ma:versionID="2d714a3296df14eba7a100bb665443ca">
   <xsd:schema xmlns:xsd="http://www.w3.org/2001/XMLSchema" xmlns:xs="http://www.w3.org/2001/XMLSchema" xmlns:p="http://schemas.microsoft.com/office/2006/metadata/properties" xmlns:ns1="http://schemas.microsoft.com/sharepoint/v3" xmlns:ns2="71af3243-3dd4-4a8d-8c0d-dd76da1f02a5" xmlns:ns3="16c05727-aa75-4e4a-9b5f-8a80a1165891" xmlns:ns4="230e9df3-be65-4c73-a93b-d1236ebd677e" targetNamespace="http://schemas.microsoft.com/office/2006/metadata/properties" ma:root="true" ma:fieldsID="49549bf45bfbbfb6cffed527380e77e1" ns1:_="" ns2:_="" ns3:_="" ns4:_="">
     <xsd:import namespace="http://schemas.microsoft.com/sharepoint/v3"/>
@@ -15452,27 +15699,36 @@
 </ct:contentTypeSchema>
 </file>
 
-<file path=customXml/itemProps1.xml><?xml version="1.0" encoding="utf-8"?>
-<ds:datastoreItem xmlns:ds="http://schemas.openxmlformats.org/officeDocument/2006/customXml" ds:itemID="{9ACE2AAA-C718-435C-B4E6-95A08ACAC441}">
-  <ds:schemaRefs>
-    <ds:schemaRef ds:uri="http://schemas.microsoft.com/sharepoint/v3/contenttype/forms"/>
-  </ds:schemaRefs>
-</ds:datastoreItem>
+<file path=customXml/item2.xml><?xml version="1.0" encoding="utf-8"?>
+<p:properties xmlns:p="http://schemas.microsoft.com/office/2006/metadata/properties" xmlns:xsi="http://www.w3.org/2001/XMLSchema-instance" xmlns:pc="http://schemas.microsoft.com/office/infopath/2007/PartnerControls">
+  <documentManagement>
+    <_ip_UnifiedCompliancePolicyUIAction xmlns="http://schemas.microsoft.com/sharepoint/v3" xsi:nil="true"/>
+    <Image xmlns="71af3243-3dd4-4a8d-8c0d-dd76da1f02a5">
+      <Url xsi:nil="true"/>
+      <Description xsi:nil="true"/>
+    </Image>
+    <Status xmlns="71af3243-3dd4-4a8d-8c0d-dd76da1f02a5">Not started</Status>
+    <Background xmlns="71af3243-3dd4-4a8d-8c0d-dd76da1f02a5">false</Background>
+    <_ip_UnifiedCompliancePolicyProperties xmlns="http://schemas.microsoft.com/sharepoint/v3" xsi:nil="true"/>
+    <ImageTagsTaxHTField xmlns="71af3243-3dd4-4a8d-8c0d-dd76da1f02a5">
+      <Terms xmlns="http://schemas.microsoft.com/office/infopath/2007/PartnerControls"/>
+    </ImageTagsTaxHTField>
+    <TaxCatchAll xmlns="230e9df3-be65-4c73-a93b-d1236ebd677e" xsi:nil="true"/>
+    <MediaServiceKeyPoints xmlns="71af3243-3dd4-4a8d-8c0d-dd76da1f02a5" xsi:nil="true"/>
+  </documentManagement>
+</p:properties>
 </file>
 
-<file path=customXml/itemProps2.xml><?xml version="1.0" encoding="utf-8"?>
-<ds:datastoreItem xmlns:ds="http://schemas.openxmlformats.org/officeDocument/2006/customXml" ds:itemID="{8FBB2F3B-6257-41BB-8B64-5AC7494F274B}">
-  <ds:schemaRefs>
-    <ds:schemaRef ds:uri="http://schemas.microsoft.com/office/2006/metadata/properties"/>
-    <ds:schemaRef ds:uri="http://schemas.microsoft.com/office/infopath/2007/PartnerControls"/>
-    <ds:schemaRef ds:uri="http://schemas.microsoft.com/sharepoint/v3"/>
-    <ds:schemaRef ds:uri="71af3243-3dd4-4a8d-8c0d-dd76da1f02a5"/>
-    <ds:schemaRef ds:uri="230e9df3-be65-4c73-a93b-d1236ebd677e"/>
-  </ds:schemaRefs>
-</ds:datastoreItem>
+<file path=customXml/item3.xml><?xml version="1.0" encoding="utf-8"?>
+<?mso-contentType ?>
+<FormTemplates xmlns="http://schemas.microsoft.com/sharepoint/v3/contenttype/forms">
+  <Display>DocumentLibraryForm</Display>
+  <Edit>DocumentLibraryForm</Edit>
+  <New>DocumentLibraryForm</New>
+</FormTemplates>
 </file>
 
-<file path=customXml/itemProps3.xml><?xml version="1.0" encoding="utf-8"?>
+<file path=customXml/itemProps1.xml><?xml version="1.0" encoding="utf-8"?>
 <ds:datastoreItem xmlns:ds="http://schemas.openxmlformats.org/officeDocument/2006/customXml" ds:itemID="{614EFF02-EA18-493C-972D-813DB244CB64}">
   <ds:schemaRefs>
     <ds:schemaRef ds:uri="http://schemas.microsoft.com/office/2006/metadata/contentType"/>
@@ -15493,6 +15749,26 @@
 </ds:datastoreItem>
 </file>
 
+<file path=customXml/itemProps2.xml><?xml version="1.0" encoding="utf-8"?>
+<ds:datastoreItem xmlns:ds="http://schemas.openxmlformats.org/officeDocument/2006/customXml" ds:itemID="{8FBB2F3B-6257-41BB-8B64-5AC7494F274B}">
+  <ds:schemaRefs>
+    <ds:schemaRef ds:uri="http://schemas.microsoft.com/office/2006/metadata/properties"/>
+    <ds:schemaRef ds:uri="http://schemas.microsoft.com/office/infopath/2007/PartnerControls"/>
+    <ds:schemaRef ds:uri="http://schemas.microsoft.com/sharepoint/v3"/>
+    <ds:schemaRef ds:uri="71af3243-3dd4-4a8d-8c0d-dd76da1f02a5"/>
+    <ds:schemaRef ds:uri="230e9df3-be65-4c73-a93b-d1236ebd677e"/>
+  </ds:schemaRefs>
+</ds:datastoreItem>
+</file>
+
+<file path=customXml/itemProps3.xml><?xml version="1.0" encoding="utf-8"?>
+<ds:datastoreItem xmlns:ds="http://schemas.openxmlformats.org/officeDocument/2006/customXml" ds:itemID="{9ACE2AAA-C718-435C-B4E6-95A08ACAC441}">
+  <ds:schemaRefs>
+    <ds:schemaRef ds:uri="http://schemas.microsoft.com/sharepoint/v3/contenttype/forms"/>
+  </ds:schemaRefs>
+</ds:datastoreItem>
+</file>
+
 <file path=docMetadata/LabelInfo.xml><?xml version="1.0" encoding="utf-8"?>
 <clbl:labelList xmlns:clbl="http://schemas.microsoft.com/office/2020/mipLabelMetadata"/>
 </file>
</xml_diff>